<commit_message>
feat: project - first item
</commit_message>
<xml_diff>
--- a/ppt/03_編輯器與第一個 Java 程式.pptx
+++ b/ppt/03_編輯器與第一個 Java 程式.pptx
@@ -214,7 +214,7 @@
           <a:p>
             <a:fld id="{7CB51037-9A88-43F8-8062-A2DDD941B0DA}" type="datetimeFigureOut">
               <a:rPr lang="zh-TW" altLang="en-US" smtClean="0"/>
-              <a:t>2025/2/11</a:t>
+              <a:t>2025/2/12</a:t>
             </a:fld>
             <a:endParaRPr lang="zh-TW" altLang="en-US"/>
           </a:p>
@@ -3835,8 +3835,14 @@
               <p:nvPr/>
             </p:nvPicPr>
             <p:blipFill rotWithShape="1">
-              <a:blip r:embed="rId3"/>
-              <a:srcRect b="862"/>
+              <a:blip r:embed="rId3" cstate="hqprint">
+                <a:extLst>
+                  <a:ext uri="{28A0092B-C50C-407E-A947-70E740481C1C}">
+                    <a14:useLocalDpi xmlns:a14="http://schemas.microsoft.com/office/drawing/2010/main"/>
+                  </a:ext>
+                </a:extLst>
+              </a:blip>
+              <a:srcRect/>
               <a:stretch/>
             </p:blipFill>
             <p:spPr>
@@ -4092,10 +4098,10 @@
             <p:nvPr/>
           </p:nvPicPr>
           <p:blipFill>
-            <a:blip r:embed="rId7">
+            <a:blip r:embed="rId7" cstate="hqprint">
               <a:extLst>
                 <a:ext uri="{28A0092B-C50C-407E-A947-70E740481C1C}">
-                  <a14:useLocalDpi xmlns:a14="http://schemas.microsoft.com/office/drawing/2010/main" val="0"/>
+                  <a14:useLocalDpi xmlns:a14="http://schemas.microsoft.com/office/drawing/2010/main"/>
                 </a:ext>
               </a:extLst>
             </a:blip>
@@ -6636,10 +6642,10 @@
             <p:nvPr/>
           </p:nvPicPr>
           <p:blipFill>
-            <a:blip r:embed="rId3">
+            <a:blip r:embed="rId3" cstate="hqprint">
               <a:extLst>
                 <a:ext uri="{28A0092B-C50C-407E-A947-70E740481C1C}">
-                  <a14:useLocalDpi xmlns:a14="http://schemas.microsoft.com/office/drawing/2010/main" val="0"/>
+                  <a14:useLocalDpi xmlns:a14="http://schemas.microsoft.com/office/drawing/2010/main"/>
                 </a:ext>
               </a:extLst>
             </a:blip>
@@ -7398,10 +7404,10 @@
             <p:nvPr/>
           </p:nvPicPr>
           <p:blipFill rotWithShape="1">
-            <a:blip r:embed="rId2">
+            <a:blip r:embed="rId2" cstate="hqprint">
               <a:extLst>
                 <a:ext uri="{28A0092B-C50C-407E-A947-70E740481C1C}">
-                  <a14:useLocalDpi xmlns:a14="http://schemas.microsoft.com/office/drawing/2010/main" val="0"/>
+                  <a14:useLocalDpi xmlns:a14="http://schemas.microsoft.com/office/drawing/2010/main"/>
                 </a:ext>
                 <a:ext uri="{96DAC541-7B7A-43D3-8B79-37D633B846F1}">
                   <asvg:svgBlip xmlns:asvg="http://schemas.microsoft.com/office/drawing/2016/SVG/main" r:embed="rId3"/>
@@ -7439,7 +7445,7 @@
             <a:blip r:embed="rId4">
               <a:extLst>
                 <a:ext uri="{28A0092B-C50C-407E-A947-70E740481C1C}">
-                  <a14:useLocalDpi xmlns:a14="http://schemas.microsoft.com/office/drawing/2010/main" val="0"/>
+                  <a14:useLocalDpi xmlns:a14="http://schemas.microsoft.com/office/drawing/2010/main"/>
                 </a:ext>
               </a:extLst>
             </a:blip>
@@ -7475,7 +7481,7 @@
             <a:blip r:embed="rId4">
               <a:extLst>
                 <a:ext uri="{28A0092B-C50C-407E-A947-70E740481C1C}">
-                  <a14:useLocalDpi xmlns:a14="http://schemas.microsoft.com/office/drawing/2010/main" val="0"/>
+                  <a14:useLocalDpi xmlns:a14="http://schemas.microsoft.com/office/drawing/2010/main"/>
                 </a:ext>
               </a:extLst>
             </a:blip>
@@ -8444,10 +8450,10 @@
             <p:nvPr/>
           </p:nvPicPr>
           <p:blipFill>
-            <a:blip r:embed="rId4">
+            <a:blip r:embed="rId4" cstate="hqprint">
               <a:extLst>
                 <a:ext uri="{28A0092B-C50C-407E-A947-70E740481C1C}">
-                  <a14:useLocalDpi xmlns:a14="http://schemas.microsoft.com/office/drawing/2010/main" val="0"/>
+                  <a14:useLocalDpi xmlns:a14="http://schemas.microsoft.com/office/drawing/2010/main"/>
                 </a:ext>
               </a:extLst>
             </a:blip>
@@ -9705,10 +9711,10 @@
               <p:nvPr/>
             </p:nvPicPr>
             <p:blipFill>
-              <a:blip r:embed="rId3">
+              <a:blip r:embed="rId3" cstate="hqprint">
                 <a:extLst>
                   <a:ext uri="{28A0092B-C50C-407E-A947-70E740481C1C}">
-                    <a14:useLocalDpi xmlns:a14="http://schemas.microsoft.com/office/drawing/2010/main" val="0"/>
+                    <a14:useLocalDpi xmlns:a14="http://schemas.microsoft.com/office/drawing/2010/main"/>
                   </a:ext>
                 </a:extLst>
               </a:blip>
@@ -9962,10 +9968,10 @@
                 <p:nvPr/>
               </p:nvPicPr>
               <p:blipFill>
-                <a:blip r:embed="rId4">
+                <a:blip r:embed="rId4" cstate="hqprint">
                   <a:extLst>
                     <a:ext uri="{28A0092B-C50C-407E-A947-70E740481C1C}">
-                      <a14:useLocalDpi xmlns:a14="http://schemas.microsoft.com/office/drawing/2010/main" val="0"/>
+                      <a14:useLocalDpi xmlns:a14="http://schemas.microsoft.com/office/drawing/2010/main"/>
                     </a:ext>
                   </a:extLst>
                 </a:blip>
@@ -10180,10 +10186,10 @@
               <p:nvPr/>
             </p:nvPicPr>
             <p:blipFill rotWithShape="1">
-              <a:blip r:embed="rId5">
+              <a:blip r:embed="rId5" cstate="hqprint">
                 <a:extLst>
                   <a:ext uri="{28A0092B-C50C-407E-A947-70E740481C1C}">
-                    <a14:useLocalDpi xmlns:a14="http://schemas.microsoft.com/office/drawing/2010/main" val="0"/>
+                    <a14:useLocalDpi xmlns:a14="http://schemas.microsoft.com/office/drawing/2010/main"/>
                   </a:ext>
                   <a:ext uri="{96DAC541-7B7A-43D3-8B79-37D633B846F1}">
                     <asvg:svgBlip xmlns:asvg="http://schemas.microsoft.com/office/drawing/2016/SVG/main" r:embed="rId6"/>
@@ -10430,10 +10436,10 @@
               <p:nvPr/>
             </p:nvPicPr>
             <p:blipFill rotWithShape="1">
-              <a:blip r:embed="rId5">
+              <a:blip r:embed="rId5" cstate="hqprint">
                 <a:extLst>
                   <a:ext uri="{28A0092B-C50C-407E-A947-70E740481C1C}">
-                    <a14:useLocalDpi xmlns:a14="http://schemas.microsoft.com/office/drawing/2010/main" val="0"/>
+                    <a14:useLocalDpi xmlns:a14="http://schemas.microsoft.com/office/drawing/2010/main"/>
                   </a:ext>
                   <a:ext uri="{96DAC541-7B7A-43D3-8B79-37D633B846F1}">
                     <asvg:svgBlip xmlns:asvg="http://schemas.microsoft.com/office/drawing/2016/SVG/main" r:embed="rId6"/>
@@ -12886,8 +12892,14 @@
           <p:nvPr/>
         </p:nvPicPr>
         <p:blipFill rotWithShape="1">
-          <a:blip r:embed="rId4"/>
-          <a:srcRect l="305" t="380" r="420" b="59436"/>
+          <a:blip r:embed="rId4" cstate="hqprint">
+            <a:extLst>
+              <a:ext uri="{28A0092B-C50C-407E-A947-70E740481C1C}">
+                <a14:useLocalDpi xmlns:a14="http://schemas.microsoft.com/office/drawing/2010/main"/>
+              </a:ext>
+            </a:extLst>
+          </a:blip>
+          <a:srcRect/>
           <a:stretch/>
         </p:blipFill>
         <p:spPr>
@@ -13545,8 +13557,14 @@
           <p:nvPr/>
         </p:nvPicPr>
         <p:blipFill rotWithShape="1">
-          <a:blip r:embed="rId3"/>
-          <a:srcRect t="2422" r="1289" b="5339"/>
+          <a:blip r:embed="rId3" cstate="hqprint">
+            <a:extLst>
+              <a:ext uri="{28A0092B-C50C-407E-A947-70E740481C1C}">
+                <a14:useLocalDpi xmlns:a14="http://schemas.microsoft.com/office/drawing/2010/main"/>
+              </a:ext>
+            </a:extLst>
+          </a:blip>
+          <a:srcRect/>
           <a:stretch/>
         </p:blipFill>
         <p:spPr>
@@ -14700,10 +14718,10 @@
               <p:nvPr/>
             </p:nvPicPr>
             <p:blipFill>
-              <a:blip r:embed="rId2">
+              <a:blip r:embed="rId2" cstate="hqprint">
                 <a:extLst>
                   <a:ext uri="{28A0092B-C50C-407E-A947-70E740481C1C}">
-                    <a14:useLocalDpi xmlns:a14="http://schemas.microsoft.com/office/drawing/2010/main" val="0"/>
+                    <a14:useLocalDpi xmlns:a14="http://schemas.microsoft.com/office/drawing/2010/main"/>
                   </a:ext>
                 </a:extLst>
               </a:blip>
@@ -14990,7 +15008,7 @@
               <a:blip r:embed="rId3">
                 <a:extLst>
                   <a:ext uri="{28A0092B-C50C-407E-A947-70E740481C1C}">
-                    <a14:useLocalDpi xmlns:a14="http://schemas.microsoft.com/office/drawing/2010/main" val="0"/>
+                    <a14:useLocalDpi xmlns:a14="http://schemas.microsoft.com/office/drawing/2010/main"/>
                   </a:ext>
                   <a:ext uri="{96DAC541-7B7A-43D3-8B79-37D633B846F1}">
                     <asvg:svgBlip xmlns:asvg="http://schemas.microsoft.com/office/drawing/2016/SVG/main" r:embed="rId4"/>
@@ -15266,7 +15284,7 @@
               <a:blip r:embed="rId5">
                 <a:extLst>
                   <a:ext uri="{28A0092B-C50C-407E-A947-70E740481C1C}">
-                    <a14:useLocalDpi xmlns:a14="http://schemas.microsoft.com/office/drawing/2010/main" val="0"/>
+                    <a14:useLocalDpi xmlns:a14="http://schemas.microsoft.com/office/drawing/2010/main"/>
                   </a:ext>
                   <a:ext uri="{96DAC541-7B7A-43D3-8B79-37D633B846F1}">
                     <asvg:svgBlip xmlns:asvg="http://schemas.microsoft.com/office/drawing/2016/SVG/main" r:embed="rId6"/>
@@ -15787,7 +15805,7 @@
               <a:blip r:embed="rId3">
                 <a:extLst>
                   <a:ext uri="{28A0092B-C50C-407E-A947-70E740481C1C}">
-                    <a14:useLocalDpi xmlns:a14="http://schemas.microsoft.com/office/drawing/2010/main" val="0"/>
+                    <a14:useLocalDpi xmlns:a14="http://schemas.microsoft.com/office/drawing/2010/main"/>
                   </a:ext>
                   <a:ext uri="{96DAC541-7B7A-43D3-8B79-37D633B846F1}">
                     <asvg:svgBlip xmlns:asvg="http://schemas.microsoft.com/office/drawing/2016/SVG/main" r:embed="rId4"/>
@@ -16038,7 +16056,7 @@
               <a:blip r:embed="rId5">
                 <a:extLst>
                   <a:ext uri="{28A0092B-C50C-407E-A947-70E740481C1C}">
-                    <a14:useLocalDpi xmlns:a14="http://schemas.microsoft.com/office/drawing/2010/main" val="0"/>
+                    <a14:useLocalDpi xmlns:a14="http://schemas.microsoft.com/office/drawing/2010/main"/>
                   </a:ext>
                   <a:ext uri="{96DAC541-7B7A-43D3-8B79-37D633B846F1}">
                     <asvg:svgBlip xmlns:asvg="http://schemas.microsoft.com/office/drawing/2016/SVG/main" r:embed="rId6"/>
@@ -16352,10 +16370,10 @@
               <p:nvPr/>
             </p:nvPicPr>
             <p:blipFill>
-              <a:blip r:embed="rId7">
+              <a:blip r:embed="rId7" cstate="hqprint">
                 <a:extLst>
                   <a:ext uri="{28A0092B-C50C-407E-A947-70E740481C1C}">
-                    <a14:useLocalDpi xmlns:a14="http://schemas.microsoft.com/office/drawing/2010/main" val="0"/>
+                    <a14:useLocalDpi xmlns:a14="http://schemas.microsoft.com/office/drawing/2010/main"/>
                   </a:ext>
                 </a:extLst>
               </a:blip>
@@ -17319,10 +17337,10 @@
             <p:nvPr/>
           </p:nvPicPr>
           <p:blipFill>
-            <a:blip r:embed="rId4">
+            <a:blip r:embed="rId4" cstate="hqprint">
               <a:extLst>
                 <a:ext uri="{28A0092B-C50C-407E-A947-70E740481C1C}">
-                  <a14:useLocalDpi xmlns:a14="http://schemas.microsoft.com/office/drawing/2010/main" val="0"/>
+                  <a14:useLocalDpi xmlns:a14="http://schemas.microsoft.com/office/drawing/2010/main"/>
                 </a:ext>
               </a:extLst>
             </a:blip>
@@ -23199,8 +23217,14 @@
           <p:nvPr/>
         </p:nvPicPr>
         <p:blipFill rotWithShape="1">
-          <a:blip r:embed="rId3"/>
-          <a:srcRect b="9302"/>
+          <a:blip r:embed="rId3" cstate="hqprint">
+            <a:extLst>
+              <a:ext uri="{28A0092B-C50C-407E-A947-70E740481C1C}">
+                <a14:useLocalDpi xmlns:a14="http://schemas.microsoft.com/office/drawing/2010/main"/>
+              </a:ext>
+            </a:extLst>
+          </a:blip>
+          <a:srcRect/>
           <a:stretch/>
         </p:blipFill>
         <p:spPr>

</xml_diff>